<commit_message>
final version of pp
</commit_message>
<xml_diff>
--- a/Presentations/MugShot Concept Pitch.pptx
+++ b/Presentations/MugShot Concept Pitch.pptx
@@ -5,7 +5,7 @@
     <p:sldMasterId id="2147483840" r:id="rId1"/>
   </p:sldMasterIdLst>
   <p:notesMasterIdLst>
-    <p:notesMasterId r:id="rId11"/>
+    <p:notesMasterId r:id="rId10"/>
   </p:notesMasterIdLst>
   <p:sldIdLst>
     <p:sldId id="256" r:id="rId2"/>
@@ -15,8 +15,7 @@
     <p:sldId id="263" r:id="rId6"/>
     <p:sldId id="259" r:id="rId7"/>
     <p:sldId id="260" r:id="rId8"/>
-    <p:sldId id="264" r:id="rId9"/>
-    <p:sldId id="262" r:id="rId10"/>
+    <p:sldId id="262" r:id="rId9"/>
   </p:sldIdLst>
   <p:sldSz cx="12192000" cy="6858000"/>
   <p:notesSz cx="6858000" cy="9144000"/>
@@ -4828,12 +4827,7 @@
             <p:ph type="title"/>
           </p:nvPr>
         </p:nvSpPr>
-        <p:spPr>
-          <a:xfrm>
-            <a:off x="252919" y="1123837"/>
-            <a:ext cx="2947482" cy="4601183"/>
-          </a:xfrm>
-        </p:spPr>
+        <p:spPr/>
         <p:txBody>
           <a:bodyPr/>
           <a:lstStyle/>
@@ -6289,94 +6283,6 @@
       </p:grpSpPr>
       <p:sp>
         <p:nvSpPr>
-          <p:cNvPr id="2" name="Title 1">
-            <a:extLst>
-              <a:ext uri="{FF2B5EF4-FFF2-40B4-BE49-F238E27FC236}">
-                <a16:creationId xmlns:a16="http://schemas.microsoft.com/office/drawing/2014/main" id="{215D351C-4F45-4CBE-8B4E-715AC0C88F70}"/>
-              </a:ext>
-            </a:extLst>
-          </p:cNvPr>
-          <p:cNvSpPr>
-            <a:spLocks noGrp="1"/>
-          </p:cNvSpPr>
-          <p:nvPr>
-            <p:ph type="title"/>
-          </p:nvPr>
-        </p:nvSpPr>
-        <p:spPr/>
-        <p:txBody>
-          <a:bodyPr/>
-          <a:lstStyle/>
-          <a:p>
-            <a:endParaRPr lang="en-GB"/>
-          </a:p>
-        </p:txBody>
-      </p:sp>
-      <p:sp>
-        <p:nvSpPr>
-          <p:cNvPr id="3" name="Content Placeholder 2">
-            <a:extLst>
-              <a:ext uri="{FF2B5EF4-FFF2-40B4-BE49-F238E27FC236}">
-                <a16:creationId xmlns:a16="http://schemas.microsoft.com/office/drawing/2014/main" id="{EEFBFB6F-E3A1-434C-99E3-6662782FC10E}"/>
-              </a:ext>
-            </a:extLst>
-          </p:cNvPr>
-          <p:cNvSpPr>
-            <a:spLocks noGrp="1"/>
-          </p:cNvSpPr>
-          <p:nvPr>
-            <p:ph idx="1"/>
-          </p:nvPr>
-        </p:nvSpPr>
-        <p:spPr/>
-        <p:txBody>
-          <a:bodyPr/>
-          <a:lstStyle/>
-          <a:p>
-            <a:r>
-              <a:rPr lang="en-US" dirty="0"/>
-              <a:t>Sound </a:t>
-            </a:r>
-            <a:r>
-              <a:rPr lang="en-US"/>
-              <a:t>Moodboard</a:t>
-            </a:r>
-            <a:endParaRPr lang="en-GB"/>
-          </a:p>
-        </p:txBody>
-      </p:sp>
-    </p:spTree>
-    <p:extLst>
-      <p:ext uri="{BB962C8B-B14F-4D97-AF65-F5344CB8AC3E}">
-        <p14:creationId xmlns:p14="http://schemas.microsoft.com/office/powerpoint/2010/main" val="296311803"/>
-      </p:ext>
-    </p:extLst>
-  </p:cSld>
-  <p:clrMapOvr>
-    <a:masterClrMapping/>
-  </p:clrMapOvr>
-</p:sld>
-</file>
-
-<file path=ppt/slides/slide9.xml><?xml version="1.0" encoding="utf-8"?>
-<p:sld xmlns:a="http://schemas.openxmlformats.org/drawingml/2006/main" xmlns:r="http://schemas.openxmlformats.org/officeDocument/2006/relationships" xmlns:p="http://schemas.openxmlformats.org/presentationml/2006/main">
-  <p:cSld>
-    <p:spTree>
-      <p:nvGrpSpPr>
-        <p:cNvPr id="1" name=""/>
-        <p:cNvGrpSpPr/>
-        <p:nvPr/>
-      </p:nvGrpSpPr>
-      <p:grpSpPr>
-        <a:xfrm>
-          <a:off x="0" y="0"/>
-          <a:ext cx="0" cy="0"/>
-          <a:chOff x="0" y="0"/>
-          <a:chExt cx="0" cy="0"/>
-        </a:xfrm>
-      </p:grpSpPr>
-      <p:sp>
-        <p:nvSpPr>
           <p:cNvPr id="2" name="Titel 1">
             <a:extLst>
               <a:ext uri="{FF2B5EF4-FFF2-40B4-BE49-F238E27FC236}">
@@ -6404,6 +6310,53 @@
           </a:p>
         </p:txBody>
       </p:sp>
+      <p:pic>
+        <p:nvPicPr>
+          <p:cNvPr id="1026" name="Picture 2" descr="Afbeeldingsresultaat voor mafia">
+            <a:extLst>
+              <a:ext uri="{FF2B5EF4-FFF2-40B4-BE49-F238E27FC236}">
+                <a16:creationId xmlns:a16="http://schemas.microsoft.com/office/drawing/2014/main" id="{AF186C20-DCD9-4C2A-8102-A52CF4AB5AE0}"/>
+              </a:ext>
+            </a:extLst>
+          </p:cNvPr>
+          <p:cNvPicPr>
+            <a:picLocks noChangeAspect="1" noChangeArrowheads="1"/>
+          </p:cNvPicPr>
+          <p:nvPr/>
+        </p:nvPicPr>
+        <p:blipFill>
+          <a:blip r:embed="rId2">
+            <a:extLst>
+              <a:ext uri="{28A0092B-C50C-407E-A947-70E740481C1C}">
+                <a14:useLocalDpi xmlns:a14="http://schemas.microsoft.com/office/drawing/2010/main" val="0"/>
+              </a:ext>
+            </a:extLst>
+          </a:blip>
+          <a:srcRect/>
+          <a:stretch>
+            <a:fillRect/>
+          </a:stretch>
+        </p:blipFill>
+        <p:spPr bwMode="auto">
+          <a:xfrm>
+            <a:off x="3439486" y="754257"/>
+            <a:ext cx="8011485" cy="5342639"/>
+          </a:xfrm>
+          <a:prstGeom prst="rect">
+            <a:avLst/>
+          </a:prstGeom>
+          <a:noFill/>
+          <a:extLst>
+            <a:ext uri="{909E8E84-426E-40DD-AFC4-6F175D3DCCD1}">
+              <a14:hiddenFill xmlns:a14="http://schemas.microsoft.com/office/drawing/2010/main">
+                <a:solidFill>
+                  <a:srgbClr val="FFFFFF"/>
+                </a:solidFill>
+              </a14:hiddenFill>
+            </a:ext>
+          </a:extLst>
+        </p:spPr>
+      </p:pic>
     </p:spTree>
     <p:extLst>
       <p:ext uri="{BB962C8B-B14F-4D97-AF65-F5344CB8AC3E}">

</xml_diff>